<commit_message>
Fix Two Content + Subtitles placeholder aliases
- Add leftSubtitle -> subtitleLeft alias
- Add rightSubtitle -> subtitleRight alias
- Fix leftContent -> contentLeft mapping
- Fix rightContent -> contentRight mapping
- Add content and sideContent aliases
- Add Slide Number Placeholder 2 to slideNumber aliases

This ensures testflow placeholder names map correctly to OOXML names.
</commit_message>
<xml_diff>
--- a/testflow.pptx
+++ b/testflow.pptx
@@ -515,7 +515,7 @@
           <a:p>
             <a:r>
               <a:rPr lang="en-US" dirty="0"/>
-              <a:t>This is the opening title slide for the presentation on data center investment's macroeconomic impact. The slide establishes the professional tone and scope of the analysis. Key speaking points should include: Welcome and introduction to the strategic importance of data center investments in today's economy. Emphasize that this analysis examines how digital infrastructure spending has reached scales that materially impact national economic indicators. Set expectations that we'll explore investment volumes, economic ripple effects, and strategic implications for various stakeholders. Note the confidential nature of the insights and S&amp;P Global's unique perspective on this emerging macroeconomic trend.</a:t>
+              <a:t>This title slide introduces our comprehensive analysis of generative AI's impact on the workforce. The presentation is based on S&amp;P Global's research findings that challenge the common narrative of mass job displacement. Instead, we'll explore how AI is driving workforce redistribution - creating new opportunities while transforming existing roles. The strategic report designation emphasizes the analytical depth and forward-looking insights we'll provide. Key themes to establish: transformation over elimination, redistribution patterns, and strategic workforce planning implications. This sets the stage for a data-driven exploration of how organizations and workers can navigate the AI-driven future of work.</a:t>
             </a:r>
             <a:endParaRPr lang="en-US" dirty="0"/>
           </a:p>
@@ -603,7 +603,7 @@
           <a:p>
             <a:r>
               <a:rPr lang="en-US" dirty="0"/>
-              <a:t>This executive summary slide establishes the foundational premise that data center investments have transcended their traditional technology sector boundaries to become a macroeconomic phenomenon. Key speaking points: Emphasize the transformation from niche to mainstream economic driver. Highlight the three primary catalysts: AI growth, cloud expansion, and digital transformation. Explain how infrastructure spending creates multiplier effects across the economy. Note that investment scales now influence national economic indicators. Set up the audience to understand why this trend requires attention from policymakers, investors, and business leaders beyond the technology sector. This slide should generate interest in the detailed analysis to follow.</a:t>
+              <a:t/>
             </a:r>
             <a:endParaRPr lang="en-US" dirty="0"/>
           </a:p>
@@ -691,7 +691,7 @@
           <a:p>
             <a:r>
               <a:rPr lang="en-US" dirty="0"/>
-              <a:t/>
+              <a:t>This slide provides essential context by establishing where we are today and how historical precedents inform our understanding of AI's impact. The left side focuses on current reality - emphasizing that we're still in early adoption phases, which gives organizations and workers time to prepare. The right side draws parallels to previous technological transitions to help audiences understand this as part of a recognizable pattern rather than an unprecedented threat. Key speaking points should include: the gradual nature of current adoption, the supplementary role AI currently plays, and how historical transitions ultimately created more jobs than they eliminated. This contextual foundation is crucial for the audience to properly interpret the redistribution findings that follow in subsequent slides.</a:t>
             </a:r>
             <a:endParaRPr lang="en-US" dirty="0"/>
           </a:p>
@@ -779,7 +779,7 @@
           <a:p>
             <a:r>
               <a:rPr lang="en-US" dirty="0"/>
-              <a:t>This slide examines the comprehensive economic ripple effects created by data center investments across multiple sectors and supply chains. Key speaking points should include: Distinguish between direct and indirect economic impacts to show the full scope of influence. Emphasize the immediate job creation during construction phases and ongoing operational employment. Highlight the capital-intensive nature driving equipment procurement across multiple industries. Discuss real estate market impacts and competition for suitable sites. Explain supply chain effects across traditional industries like steel and concrete. Focus on energy sector implications as data centers become major power consumers. Note the cluster effects that attract related technology companies and create innovation hubs. This slide demonstrates why data center investments have macroeconomic significance beyond their immediate technology sector classification.</a:t>
+              <a:t/>
             </a:r>
             <a:endParaRPr lang="en-US" dirty="0"/>
           </a:p>
@@ -867,7 +867,7 @@
           <a:p>
             <a:r>
               <a:rPr lang="en-US" dirty="0"/>
-              <a:t>This concluding slide synthesizes the strategic implications and provides actionable guidance for different stakeholder groups. Key speaking points should include: Emphasize the need to integrate data center trends into economic forecasting and planning. Address specific considerations for policymakers including infrastructure, energy, and workforce planning. Highlight the shift in investor perspective from technology to infrastructure investment classification. Discuss regional development strategies and competitive advantages of data center clustering. Address energy utility planning requirements and grid modernization needs. Note the need for new real estate analytical frameworks. Emphasize the intersection of technological change with macroeconomic implications. Conclude with the importance of coordinated approaches that recognize data centers as critical economic infrastructure. This slide should leave the audience with clear understanding of why data center investments matter for their specific roles and decision-making processes.</a:t>
+              <a:t/>
             </a:r>
             <a:endParaRPr lang="en-US" dirty="0"/>
           </a:p>
@@ -25457,7 +25457,7 @@
       </p:sp>
       <p:pic>
         <p:nvPicPr>
-          <p:cNvPr id="100" name="Image 0" descr="https://snp-mediaportal.qbank.se/assets/deployedFiles/b1df7db893866364c914f2942049e8bf.png"/>
+          <p:cNvPr id="100" name="Image 0" descr="https://snp-mediaportal.qbank.se/assets/deployedFiles/0171221a07b0be1374ebaa6bc786f2b5.png"/>
           <p:cNvPicPr>
             <a:picLocks noChangeAspect="1"/>
           </p:cNvPicPr>
@@ -34118,7 +34118,7 @@
           <p:cNvPr id="2" name="Text 0"/>
           <p:cNvSpPr/>
           <p:nvPr>
-            <p:ph idx="101" type="title" hasCustomPrompt="1"/>
+            <p:ph type="title" hasCustomPrompt="1"/>
           </p:nvPr>
         </p:nvSpPr>
         <p:spPr/>
@@ -34128,7 +34128,7 @@
           <a:p>
             <a:r>
               <a:rPr lang="en-US" dirty="0"/>
-              <a:t>Data Center Investment Moves Macro Needle</a:t>
+              <a:t>Generative AI and Future Work</a:t>
             </a:r>
             <a:endParaRPr lang="en-US" dirty="0"/>
           </a:p>
@@ -34139,7 +34139,7 @@
           <p:cNvPr id="3" name="Text 0"/>
           <p:cNvSpPr/>
           <p:nvPr>
-            <p:ph idx="18" type="body" hasCustomPrompt="1"/>
+            <p:ph idx="14" type="body" hasCustomPrompt="1"/>
           </p:nvPr>
         </p:nvSpPr>
         <p:spPr/>
@@ -34149,7 +34149,7 @@
           <a:p>
             <a:r>
               <a:rPr lang="en-US" dirty="0"/>
-              <a:t>Infrastructure Growth Driving Economic Transformation</a:t>
+              <a:t>Workforce Redistribution Over Reduction</a:t>
             </a:r>
             <a:endParaRPr lang="en-US" dirty="0"/>
           </a:p>
@@ -34160,7 +34160,7 @@
           <p:cNvPr id="4" name="Text 0"/>
           <p:cNvSpPr/>
           <p:nvPr>
-            <p:ph idx="14" type="body" hasCustomPrompt="1"/>
+            <p:ph idx="20" type="body" hasCustomPrompt="1"/>
           </p:nvPr>
         </p:nvSpPr>
         <p:spPr/>
@@ -34170,7 +34170,7 @@
           <a:p>
             <a:r>
               <a:rPr lang="en-US" dirty="0"/>
-              <a:t>Mizan Bin abdul rahman / Market Intelligence / Senior Analyst</a:t>
+              <a:t>Mizan Bin Abdul Rahman / Market Intelligence / Senior Analyst</a:t>
             </a:r>
             <a:endParaRPr lang="en-US" dirty="0"/>
           </a:p>
@@ -34181,7 +34181,7 @@
           <p:cNvPr id="5" name="Text 0"/>
           <p:cNvSpPr/>
           <p:nvPr>
-            <p:ph idx="17" type="body" hasCustomPrompt="1"/>
+            <p:ph idx="18" type="body" hasCustomPrompt="1"/>
           </p:nvPr>
         </p:nvSpPr>
         <p:spPr/>
@@ -34202,7 +34202,7 @@
           <p:cNvPr id="6" name="Text 0"/>
           <p:cNvSpPr/>
           <p:nvPr>
-            <p:ph idx="20" type="body" hasCustomPrompt="1"/>
+            <p:ph idx="21" type="body" hasCustomPrompt="1"/>
           </p:nvPr>
         </p:nvSpPr>
         <p:spPr/>
@@ -34210,10 +34210,6 @@
           <a:bodyPr/>
           <a:lstStyle/>
           <a:p>
-            <a:r>
-              <a:rPr lang="en-US" dirty="0"/>
-              <a:t>Confidential</a:t>
-            </a:r>
             <a:endParaRPr lang="en-US" dirty="0"/>
           </a:p>
         </p:txBody>
@@ -34223,7 +34219,7 @@
           <p:cNvPr id="7" name="Text 0"/>
           <p:cNvSpPr/>
           <p:nvPr>
-            <p:ph idx="104" type="dt" hasCustomPrompt="1"/>
+            <p:ph idx="17" type="body" hasCustomPrompt="1"/>
           </p:nvPr>
         </p:nvSpPr>
         <p:spPr/>
@@ -34233,7 +34229,7 @@
           <a:p>
             <a:r>
               <a:rPr lang="en-US" dirty="0"/>
-              <a:t>December 30, 2025</a:t>
+              <a:t>December 2024</a:t>
             </a:r>
             <a:endParaRPr lang="en-US" dirty="0"/>
           </a:p>
@@ -34241,7 +34237,7 @@
       </p:sp>
       <p:pic>
         <p:nvPicPr>
-          <p:cNvPr id="8" name="Image 0" descr="https://snp-mediaportal.qbank.se/assets/deployedFiles/c7ca8c7d873a5b91534e3755925f5d7c.jpg">    </p:cNvPr>
+          <p:cNvPr id="8" name="Image 0" descr="https://snp-mediaportal.qbank.se/assets/deployedFiles/9f0cb2a217f0a72991a451a46b1a3f05.jpg">    </p:cNvPr>
           <p:cNvPicPr>
             <a:picLocks noChangeAspect="1"/>
           </p:cNvPicPr>
@@ -34333,7 +34329,7 @@
           <p:cNvPr id="3" name="Text 0"/>
           <p:cNvSpPr/>
           <p:nvPr>
-            <p:ph idx="103" type="title" hasCustomPrompt="1"/>
+            <p:ph type="title" hasCustomPrompt="1"/>
           </p:nvPr>
         </p:nvSpPr>
         <p:spPr/>
@@ -34343,7 +34339,7 @@
           <a:p>
             <a:r>
               <a:rPr lang="en-US" dirty="0"/>
-              <a:t>Data Centers as Economic Drivers</a:t>
+              <a:t>The Redistribution Reality</a:t>
             </a:r>
             <a:endParaRPr lang="en-US" dirty="0"/>
           </a:p>
@@ -34364,7 +34360,7 @@
           <a:p>
             <a:r>
               <a:rPr lang="en-US" dirty="0"/>
-              <a:t>Investment scale reaching macroeconomic significance</a:t>
+              <a:t>Key findings challenge displacement fears</a:t>
             </a:r>
             <a:endParaRPr lang="en-US" dirty="0"/>
           </a:p>
@@ -34375,7 +34371,7 @@
           <p:cNvPr id="5" name="Text 0"/>
           <p:cNvSpPr/>
           <p:nvPr>
-            <p:ph idx="15" type="body" hasCustomPrompt="1"/>
+            <p:ph idx="20" type="ftr" hasCustomPrompt="1"/>
           </p:nvPr>
         </p:nvSpPr>
         <p:spPr/>
@@ -34385,7 +34381,7 @@
           <a:p>
             <a:r>
               <a:rPr lang="en-US" dirty="0"/>
-              <a:t>Data Center Investment / December 2025</a:t>
+              <a:t>Market Intelligence / Generative AI and Future Work / December 2024</a:t>
             </a:r>
             <a:endParaRPr lang="en-US" dirty="0"/>
           </a:p>
@@ -34406,7 +34402,7 @@
           <a:p>
             <a:r>
               <a:rPr lang="en-US" dirty="0"/>
-              <a:t>Data center investments have evolved from niche technology spending to a significant macroeconomic force. The sector now represents substantial capital flows that materially impact national and regional economic indicators. Key drivers include the explosive growth in artificial intelligence applications, cloud computing expansion, and accelerating digital transformation across industries. This infrastructure buildout creates cascading economic effects through construction, real estate, energy consumption, and technology supply chains. The scale of investment has reached levels where data center development can influence GDP growth, employment statistics, and regional economic development patterns. Understanding these dynamics is crucial for economic forecasting and strategic planning across multiple sectors.</a:t>
+              <a:t>Contrary to widespread fears of mass unemployment, S&amp;P Global's research reveals that generative AI will primarily redistribute rather than eliminate jobs across the economy. The analysis shows that while certain routine and repetitive tasks face automation, the technology simultaneously creates new roles and enhances existing positions requiring human creativity, emotional intelligence, and complex problem-solving. This redistribution pattern mirrors historical technological transitions, where innovation displaced some jobs while generating entirely new categories of employment. The research identifies three primary workforce segments: jobs that will be enhanced by AI collaboration, roles that will be transformed but remain human-centric, and entirely new positions emerging from AI implementation and management needs. Rather than the apocalyptic scenarios often portrayed, the data suggests a more nuanced transformation where workers adapt their skills and organizations restructure their operations to leverage both human and artificial intelligence capabilities effectively.</a:t>
             </a:r>
             <a:endParaRPr lang="en-US" dirty="0"/>
           </a:p>
@@ -34417,7 +34413,7 @@
           <p:cNvPr id="7" name="Text 0"/>
           <p:cNvSpPr/>
           <p:nvPr>
-            <p:ph idx="107" type="body" hasCustomPrompt="1"/>
+            <p:ph idx="15" type="body" hasCustomPrompt="1"/>
           </p:nvPr>
         </p:nvSpPr>
         <p:spPr/>
@@ -34427,7 +34423,7 @@
           <a:p>
             <a:r>
               <a:rPr lang="en-US" dirty="0"/>
-              <a:t>Source: S&amp;P Global | Web sources: https://www.spglobal.com/en/research-insights/special-reports/look-forward/data-center-frontiers/data-center-investment-moves-macro-needle</a:t>
+              <a:t>Source: S&amp;P Global | Web sources: https://www.spglobal.com/en/research-insights/special-reports/generative-ai-workforce-more-redistribution-than-reduction</a:t>
             </a:r>
             <a:endParaRPr lang="en-US" dirty="0"/>
           </a:p>
@@ -34484,7 +34480,7 @@
           <p:cNvPr id="3" name="Text 0"/>
           <p:cNvSpPr/>
           <p:nvPr>
-            <p:ph idx="103" type="title" hasCustomPrompt="1"/>
+            <p:ph type="title" hasCustomPrompt="1"/>
           </p:nvPr>
         </p:nvSpPr>
         <p:spPr/>
@@ -34494,7 +34490,7 @@
           <a:p>
             <a:r>
               <a:rPr lang="en-US" dirty="0"/>
-              <a:t>Investment Scale and Market Dynamics</a:t>
+              <a:t>Current AI Adoption Landscape</a:t>
             </a:r>
             <a:endParaRPr lang="en-US" dirty="0"/>
           </a:p>
@@ -34505,7 +34501,7 @@
           <p:cNvPr id="4" name="Text 0"/>
           <p:cNvSpPr/>
           <p:nvPr>
-            <p:ph idx="18" type="body" hasCustomPrompt="1"/>
+            <p:ph idx="13" type="body" hasCustomPrompt="1"/>
           </p:nvPr>
         </p:nvSpPr>
         <p:spPr/>
@@ -34515,7 +34511,7 @@
           <a:p>
             <a:r>
               <a:rPr lang="en-US" dirty="0"/>
-              <a:t>Capital flows reaching infrastructure-level significance</a:t>
+              <a:t>Understanding today's baseline for tomorrow's transformation</a:t>
             </a:r>
             <a:endParaRPr lang="en-US" dirty="0"/>
           </a:p>
@@ -34526,7 +34522,7 @@
           <p:cNvPr id="5" name="Text 0"/>
           <p:cNvSpPr/>
           <p:nvPr>
-            <p:ph idx="36" type="body" hasCustomPrompt="1"/>
+            <p:ph idx="24" type="ftr" hasCustomPrompt="1"/>
           </p:nvPr>
         </p:nvSpPr>
         <p:spPr/>
@@ -34536,7 +34532,7 @@
           <a:p>
             <a:r>
               <a:rPr lang="en-US" dirty="0"/>
-              <a:t>The magnitude of data center investments now rivals traditional infrastructure sectors in terms of capital deployment and economic impact. Hyperscale cloud providers and enterprise customers are driving unprecedented spending levels, with individual facilities requiring hundreds of millions in capital investment. Geographic concentration in key markets creates regional economic hotspots, while the global nature of digital services drives international capital flows. The sector's capital intensity, combined with rapid deployment timelines, generates immediate economic activity through construction, equipment procurement, and workforce development. This investment velocity distinguishes data centers from traditional infrastructure, creating more immediate but equally substantial economic effects across multiple regions simultaneously.</a:t>
+              <a:t>Market Intelligence / Generative AI and Future Work / December 2024</a:t>
             </a:r>
             <a:endParaRPr lang="en-US" dirty="0"/>
           </a:p>
@@ -34547,7 +34543,7 @@
           <p:cNvPr id="6" name="Text 0"/>
           <p:cNvSpPr/>
           <p:nvPr>
-            <p:ph idx="106" type="chart" hasCustomPrompt="1"/>
+            <p:ph idx="13" type="body" hasCustomPrompt="1"/>
           </p:nvPr>
         </p:nvSpPr>
         <p:spPr/>
@@ -34557,7 +34553,7 @@
           <a:p>
             <a:r>
               <a:rPr lang="en-US" dirty="0"/>
-              <a:t>Investment data visualization would appear here if specific figures were provided in source material</a:t>
+              <a:t>Present State</a:t>
             </a:r>
             <a:endParaRPr lang="en-US" dirty="0"/>
           </a:p>
@@ -34568,7 +34564,7 @@
           <p:cNvPr id="7" name="Text 0"/>
           <p:cNvSpPr/>
           <p:nvPr>
-            <p:ph idx="15" type="body" hasCustomPrompt="1"/>
+            <p:ph idx="22" type="body" hasCustomPrompt="1"/>
           </p:nvPr>
         </p:nvSpPr>
         <p:spPr/>
@@ -34578,7 +34574,7 @@
           <a:p>
             <a:r>
               <a:rPr lang="en-US" dirty="0"/>
-              <a:t>Data Center Investment / December 2025</a:t>
+              <a:t>Organizations across industries are in early-stage AI adoption, with most companies experimenting with generative AI tools for content creation, customer service, and data analysis. Current implementation focuses primarily on productivity enhancement rather than workforce replacement. The technology remains largely supplementary to human workers, requiring significant human oversight and intervention. Most businesses report positive initial results but acknowledge the need for substantial infrastructure investment and employee training to realize full potential benefits.</a:t>
             </a:r>
             <a:endParaRPr lang="en-US" dirty="0"/>
           </a:p>
@@ -34589,7 +34585,7 @@
           <p:cNvPr id="8" name="Text 0"/>
           <p:cNvSpPr/>
           <p:nvPr>
-            <p:ph idx="37" type="body" hasCustomPrompt="1"/>
+            <p:ph idx="13" type="body" hasCustomPrompt="1"/>
           </p:nvPr>
         </p:nvSpPr>
         <p:spPr/>
@@ -34599,9 +34595,137 @@
           <a:p>
             <a:r>
               <a:rPr lang="en-US" dirty="0"/>
-              <a:t>Source: S&amp;P Global | Web sources: https://www.spglobal.com/en/research-insights/special-reports/look-forward/data-center-frontiers/data-center-investment-moves-macro-needle</a:t>
+              <a:t>Historical Context</a:t>
             </a:r>
             <a:endParaRPr lang="en-US" dirty="0"/>
+          </a:p>
+        </p:txBody>
+      </p:sp>
+      <p:sp>
+        <p:nvSpPr>
+          <p:cNvPr id="9" name="Text 0"/>
+          <p:cNvSpPr/>
+          <p:nvPr>
+            <p:ph idx="13" type="body" hasCustomPrompt="1"/>
+          </p:nvPr>
+        </p:nvSpPr>
+        <p:spPr/>
+        <p:txBody>
+          <a:bodyPr/>
+          <a:lstStyle/>
+          <a:p>
+            <a:r>
+              <a:rPr lang="en-US" dirty="0"/>
+              <a:t>Previous technological revolutions provide valuable precedent for understanding AI's workforce impact. The industrial revolution initially displaced agricultural workers but created manufacturing jobs. Computer adoption in the 1980s-90s eliminated some clerical positions while generating entire new sectors in IT, software development, and digital services. Each transition period involved temporary displacement followed by skill adaptation and new opportunity creation. These historical patterns suggest that workforce disruption, while challenging, typically results in net job creation over time as economies adapt to new technological capabilities.</a:t>
+            </a:r>
+            <a:endParaRPr lang="en-US" dirty="0"/>
+          </a:p>
+        </p:txBody>
+      </p:sp>
+      <p:sp>
+        <p:nvSpPr>
+          <p:cNvPr id="10" name="Text 0"/>
+          <p:cNvSpPr/>
+          <p:nvPr>
+            <p:ph idx="15" type="body" hasCustomPrompt="1"/>
+          </p:nvPr>
+        </p:nvSpPr>
+        <p:spPr/>
+        <p:txBody>
+          <a:bodyPr/>
+          <a:lstStyle/>
+          <a:p>
+            <a:r>
+              <a:rPr lang="en-US" dirty="0"/>
+              <a:t>Source: S&amp;P Global | Web sources: https://www.spglobal.com/en/research-insights/special-reports/generative-ai-workforce-more-redistribution-than-reduction</a:t>
+            </a:r>
+            <a:endParaRPr lang="en-US" dirty="0"/>
+          </a:p>
+        </p:txBody>
+      </p:sp>
+      <p:sp>
+        <p:nvSpPr>
+          <p:cNvPr id="12" name="Text 0"/>
+          <p:cNvSpPr/>
+          <p:nvPr>
+            <p:ph idx="16" type="body" hasCustomPrompt="1"/>
+          </p:nvPr>
+        </p:nvSpPr>
+        <p:spPr/>
+        <p:txBody>
+          <a:bodyPr wrap="none" rtlCol="0" anchor="ctr"/>
+          <a:lstStyle/>
+          <a:p>
+            <a:pPr algn="l" indent="0" marL="0">
+              <a:buNone/>
+            </a:pPr>
+            <a:endParaRPr lang="en-US" sz="1800" dirty="0"/>
+          </a:p>
+        </p:txBody>
+      </p:sp>
+      <p:sp>
+        <p:nvSpPr>
+          <p:cNvPr id="13" name="Text 0"/>
+          <p:cNvSpPr/>
+          <p:nvPr>
+            <p:ph idx="22" type="body" hasCustomPrompt="1"/>
+          </p:nvPr>
+        </p:nvSpPr>
+        <p:spPr/>
+        <p:txBody>
+          <a:bodyPr wrap="none" rtlCol="0" anchor="t"/>
+          <a:lstStyle/>
+          <a:p>
+            <a:pPr algn="l" indent="0" marL="0">
+              <a:spcAft>
+                <a:spcPts val="600"/>
+              </a:spcAft>
+              <a:buNone/>
+            </a:pPr>
+            <a:endParaRPr lang="en-US" sz="1200" dirty="0"/>
+          </a:p>
+        </p:txBody>
+      </p:sp>
+      <p:sp>
+        <p:nvSpPr>
+          <p:cNvPr id="14" name="Text 0"/>
+          <p:cNvSpPr/>
+          <p:nvPr>
+            <p:ph idx="19" type="body" hasCustomPrompt="1"/>
+          </p:nvPr>
+        </p:nvSpPr>
+        <p:spPr/>
+        <p:txBody>
+          <a:bodyPr wrap="none" rtlCol="0" anchor="ctr"/>
+          <a:lstStyle/>
+          <a:p>
+            <a:pPr algn="l" indent="0" marL="0">
+              <a:buNone/>
+            </a:pPr>
+            <a:endParaRPr lang="en-US" sz="1800" dirty="0"/>
+          </a:p>
+        </p:txBody>
+      </p:sp>
+      <p:sp>
+        <p:nvSpPr>
+          <p:cNvPr id="15" name="Text 0"/>
+          <p:cNvSpPr/>
+          <p:nvPr>
+            <p:ph idx="20" type="body" hasCustomPrompt="1"/>
+          </p:nvPr>
+        </p:nvSpPr>
+        <p:spPr/>
+        <p:txBody>
+          <a:bodyPr wrap="none" rtlCol="0" anchor="t"/>
+          <a:lstStyle/>
+          <a:p>
+            <a:pPr algn="l" indent="0" marL="0">
+              <a:spcAft>
+                <a:spcPts val="600"/>
+              </a:spcAft>
+              <a:buNone/>
+            </a:pPr>
+            <a:endParaRPr lang="en-US" sz="1200" dirty="0"/>
           </a:p>
         </p:txBody>
       </p:sp>
@@ -34656,7 +34780,7 @@
           <p:cNvPr id="3" name="Text 0"/>
           <p:cNvSpPr/>
           <p:nvPr>
-            <p:ph idx="103" type="title" hasCustomPrompt="1"/>
+            <p:ph type="title" hasCustomPrompt="1"/>
           </p:nvPr>
         </p:nvSpPr>
         <p:spPr/>
@@ -34666,7 +34790,7 @@
           <a:p>
             <a:r>
               <a:rPr lang="en-US" dirty="0"/>
-              <a:t>Economic Ripple Effects Across Sectors</a:t>
+              <a:t>Workforce Impact Categories</a:t>
             </a:r>
             <a:endParaRPr lang="en-US" dirty="0"/>
           </a:p>
@@ -34687,7 +34811,7 @@
           <a:p>
             <a:r>
               <a:rPr lang="en-US" dirty="0"/>
-              <a:t>Cascading impacts throughout the economy</a:t>
+              <a:t>How generative AI reshapes different job types</a:t>
             </a:r>
             <a:endParaRPr lang="en-US" dirty="0"/>
           </a:p>
@@ -34698,7 +34822,7 @@
           <p:cNvPr id="5" name="Text 0"/>
           <p:cNvSpPr/>
           <p:nvPr>
-            <p:ph idx="15" type="body" hasCustomPrompt="1"/>
+            <p:ph idx="16" type="body" hasCustomPrompt="1"/>
           </p:nvPr>
         </p:nvSpPr>
         <p:spPr/>
@@ -34708,7 +34832,7 @@
           <a:p>
             <a:r>
               <a:rPr lang="en-US" dirty="0"/>
-              <a:t>Data Center Investment / December 2025</a:t>
+              <a:t>Enhanced</a:t>
             </a:r>
             <a:endParaRPr lang="en-US" dirty="0"/>
           </a:p>
@@ -34719,7 +34843,7 @@
           <p:cNvPr id="6" name="Text 0"/>
           <p:cNvSpPr/>
           <p:nvPr>
-            <p:ph idx="16" type="body" hasCustomPrompt="1"/>
+            <p:ph idx="24" type="body" hasCustomPrompt="1"/>
           </p:nvPr>
         </p:nvSpPr>
         <p:spPr/>
@@ -34729,7 +34853,7 @@
           <a:p>
             <a:r>
               <a:rPr lang="en-US" dirty="0"/>
-              <a:t>Direct Economic Impact</a:t>
+              <a:t>Jobs augmented by AI tools while maintaining human centrality. Creative professionals, analysts, and strategic roles benefit from AI assistance without replacement risk.</a:t>
             </a:r>
             <a:endParaRPr lang="en-US" dirty="0"/>
           </a:p>
@@ -34740,7 +34864,7 @@
           <p:cNvPr id="7" name="Text 0"/>
           <p:cNvSpPr/>
           <p:nvPr>
-            <p:ph idx="22" type="body" hasCustomPrompt="1"/>
+            <p:ph idx="17" type="body" hasCustomPrompt="1"/>
           </p:nvPr>
         </p:nvSpPr>
         <p:spPr/>
@@ -34750,7 +34874,7 @@
           <a:p>
             <a:r>
               <a:rPr lang="en-US" dirty="0"/>
-              <a:t>Data center construction generates immediate economic activity through large-scale infrastructure projects requiring specialized construction expertise, advanced cooling systems, and sophisticated power infrastructure. Each facility creates hundreds of construction jobs during buildout phases, with ongoing operational employment for technical specialists, security personnel, and maintenance teams. The capital-intensive nature means substantial equipment procurement from technology vendors, electrical contractors, and mechanical systems providers. Real estate markets experience significant impacts as data center operators compete for suitable land with power access and connectivity infrastructure.</a:t>
+              <a:t>Transformed</a:t>
             </a:r>
             <a:endParaRPr lang="en-US" dirty="0"/>
           </a:p>
@@ -34761,7 +34885,7 @@
           <p:cNvPr id="8" name="Text 0"/>
           <p:cNvSpPr/>
           <p:nvPr>
-            <p:ph idx="19" type="body" hasCustomPrompt="1"/>
+            <p:ph idx="25" type="body" hasCustomPrompt="1"/>
           </p:nvPr>
         </p:nvSpPr>
         <p:spPr/>
@@ -34771,7 +34895,7 @@
           <a:p>
             <a:r>
               <a:rPr lang="en-US" dirty="0"/>
-              <a:t>Indirect Economic Effects</a:t>
+              <a:t>Roles requiring significant skill adaptation as AI handles routine tasks. Workers focus on higher-value activities, relationship management, and complex problem-solving.</a:t>
             </a:r>
             <a:endParaRPr lang="en-US" dirty="0"/>
           </a:p>
@@ -34782,7 +34906,7 @@
           <p:cNvPr id="9" name="Text 0"/>
           <p:cNvSpPr/>
           <p:nvPr>
-            <p:ph idx="20" type="body" hasCustomPrompt="1"/>
+            <p:ph idx="19" type="body" hasCustomPrompt="1"/>
           </p:nvPr>
         </p:nvSpPr>
         <p:spPr/>
@@ -34792,7 +34916,7 @@
           <a:p>
             <a:r>
               <a:rPr lang="en-US" dirty="0"/>
-              <a:t>Supply chain effects extend across multiple industries including steel, concrete, electrical components, and advanced cooling technologies. Energy sector impacts are substantial as data centers become major electricity consumers, driving utility infrastructure investments and renewable energy development. Local service economies benefit from increased business activity, while transportation networks see enhanced demand for logistics and connectivity services. The concentration of digital infrastructure attracts related technology companies, creating innovation clusters that generate additional economic activity and high-skilled employment opportunities in surrounding regions.</a:t>
+              <a:t>Displaced</a:t>
             </a:r>
             <a:endParaRPr lang="en-US" dirty="0"/>
           </a:p>
@@ -34803,7 +34927,7 @@
           <p:cNvPr id="10" name="Text 0"/>
           <p:cNvSpPr/>
           <p:nvPr>
-            <p:ph idx="110" type="body" hasCustomPrompt="1"/>
+            <p:ph idx="26" type="body" hasCustomPrompt="1"/>
           </p:nvPr>
         </p:nvSpPr>
         <p:spPr/>
@@ -34813,7 +34937,91 @@
           <a:p>
             <a:r>
               <a:rPr lang="en-US" dirty="0"/>
-              <a:t>Source: S&amp;P Global | Web sources: https://www.spglobal.com/en/research-insights/special-reports/look-forward/data-center-frontiers/data-center-investment-moves-macro-needle</a:t>
+              <a:t>Positions with high automation potential, primarily routine, repetitive tasks. However, displacement occurs gradually, allowing time for reskilling and transition planning.</a:t>
+            </a:r>
+            <a:endParaRPr lang="en-US" dirty="0"/>
+          </a:p>
+        </p:txBody>
+      </p:sp>
+      <p:sp>
+        <p:nvSpPr>
+          <p:cNvPr id="11" name="Text 0"/>
+          <p:cNvSpPr/>
+          <p:nvPr>
+            <p:ph idx="21" type="body" hasCustomPrompt="1"/>
+          </p:nvPr>
+        </p:nvSpPr>
+        <p:spPr/>
+        <p:txBody>
+          <a:bodyPr/>
+          <a:lstStyle/>
+          <a:p>
+            <a:r>
+              <a:rPr lang="en-US" dirty="0"/>
+              <a:t>Created</a:t>
+            </a:r>
+            <a:endParaRPr lang="en-US" dirty="0"/>
+          </a:p>
+        </p:txBody>
+      </p:sp>
+      <p:sp>
+        <p:nvSpPr>
+          <p:cNvPr id="12" name="Text 0"/>
+          <p:cNvSpPr/>
+          <p:nvPr>
+            <p:ph idx="27" type="body" hasCustomPrompt="1"/>
+          </p:nvPr>
+        </p:nvSpPr>
+        <p:spPr/>
+        <p:txBody>
+          <a:bodyPr/>
+          <a:lstStyle/>
+          <a:p>
+            <a:r>
+              <a:rPr lang="en-US" dirty="0"/>
+              <a:t>New roles emerging from AI implementation needs. AI trainers, prompt engineers, human-AI collaboration specialists, and AI ethics officers represent growing job categories.</a:t>
+            </a:r>
+            <a:endParaRPr lang="en-US" dirty="0"/>
+          </a:p>
+        </p:txBody>
+      </p:sp>
+      <p:sp>
+        <p:nvSpPr>
+          <p:cNvPr id="13" name="Text 0"/>
+          <p:cNvSpPr/>
+          <p:nvPr>
+            <p:ph idx="31" type="ftr" hasCustomPrompt="1"/>
+          </p:nvPr>
+        </p:nvSpPr>
+        <p:spPr/>
+        <p:txBody>
+          <a:bodyPr/>
+          <a:lstStyle/>
+          <a:p>
+            <a:r>
+              <a:rPr lang="en-US" dirty="0"/>
+              <a:t>Market Intelligence / Generative AI and Future Work / December 2024</a:t>
+            </a:r>
+            <a:endParaRPr lang="en-US" dirty="0"/>
+          </a:p>
+        </p:txBody>
+      </p:sp>
+      <p:sp>
+        <p:nvSpPr>
+          <p:cNvPr id="14" name="Text 0"/>
+          <p:cNvSpPr/>
+          <p:nvPr>
+            <p:ph idx="15" type="body" hasCustomPrompt="1"/>
+          </p:nvPr>
+        </p:nvSpPr>
+        <p:spPr/>
+        <p:txBody>
+          <a:bodyPr/>
+          <a:lstStyle/>
+          <a:p>
+            <a:r>
+              <a:rPr lang="en-US" dirty="0"/>
+              <a:t>Source: S&amp;P Global | Web sources: https://www.spglobal.com/en/research-insights/special-reports/generative-ai-workforce-more-redistribution-than-reduction</a:t>
             </a:r>
             <a:endParaRPr lang="en-US" dirty="0"/>
           </a:p>
@@ -34870,7 +35078,7 @@
           <p:cNvPr id="3" name="Text 0"/>
           <p:cNvSpPr/>
           <p:nvPr>
-            <p:ph idx="103" type="title" hasCustomPrompt="1"/>
+            <p:ph type="title" hasCustomPrompt="1"/>
           </p:nvPr>
         </p:nvSpPr>
         <p:spPr/>
@@ -34880,7 +35088,7 @@
           <a:p>
             <a:r>
               <a:rPr lang="en-US" dirty="0"/>
-              <a:t>Strategic Implications and Market Outlook for Economic Planning</a:t>
+              <a:t>Strategic Workforce Planning</a:t>
             </a:r>
             <a:endParaRPr lang="en-US" dirty="0"/>
           </a:p>
@@ -34901,7 +35109,7 @@
           <a:p>
             <a:r>
               <a:rPr lang="en-US" dirty="0"/>
-              <a:t>Critical considerations for stakeholders and policymakers</a:t>
+              <a:t>Preparing for the redistribution reality</a:t>
             </a:r>
             <a:endParaRPr lang="en-US" dirty="0"/>
           </a:p>
@@ -34912,7 +35120,7 @@
           <p:cNvPr id="5" name="Text 0"/>
           <p:cNvSpPr/>
           <p:nvPr>
-            <p:ph idx="15" type="body" hasCustomPrompt="1"/>
+            <p:ph idx="23" type="ftr" hasCustomPrompt="1"/>
           </p:nvPr>
         </p:nvSpPr>
         <p:spPr/>
@@ -34922,7 +35130,7 @@
           <a:p>
             <a:r>
               <a:rPr lang="en-US" dirty="0"/>
-              <a:t>Data Center Investment / December 2025</a:t>
+              <a:t>Market Intelligence / Generative AI and Future Work / December 2024</a:t>
             </a:r>
             <a:endParaRPr lang="en-US" dirty="0"/>
           </a:p>
@@ -34933,7 +35141,7 @@
           <p:cNvPr id="6" name="Text 0"/>
           <p:cNvSpPr/>
           <p:nvPr>
-            <p:ph idx="17" type="body" hasCustomPrompt="1"/>
+            <p:ph idx="22" type="body" hasCustomPrompt="1"/>
           </p:nvPr>
         </p:nvSpPr>
         <p:spPr/>
@@ -34943,7 +35151,7 @@
           <a:p>
             <a:r>
               <a:rPr lang="en-US" dirty="0"/>
-              <a:t>Data center investment trends require integration into economic forecasting models and strategic planning frameworks across multiple stakeholder groups. Policymakers must consider infrastructure capacity, energy grid stability, and workforce development to support continued growth in this sector. Investors need to evaluate data center investments as infrastructure plays with long-term economic implications rather than purely technology investments. Regional economic development strategies should account for the clustering effects and competitive advantages that data center hubs create. Energy utilities must plan for substantial increases in power demand and grid modernization requirements. Real estate markets require new analytical frameworks to assess the impact of data center development on local economies. The rapid pace of technological change, combined with substantial capital requirements, creates both opportunities and risks that demand sophisticated understanding of the intersection between digital infrastructure and macroeconomic trends. Success in this environment requires coordinated approaches that recognize data centers as critical economic infrastructure rather than isolated technology investments.</a:t>
+              <a:t>Organizations must shift from defensive to proactive workforce strategies as generative AI reshapes job markets. The redistribution pattern identified by S&amp;P Global research requires immediate action in three critical areas: skills development programs that prepare workers for enhanced and transformed roles, strategic workforce planning that anticipates new job categories and requirements, and change management processes that support smooth transitions. Companies should invest in continuous learning platforms, establish AI-human collaboration frameworks, and develop clear career pathways for workers moving between job categories. The gradual nature of AI adoption provides a window of opportunity for thoughtful preparation rather than reactive responses.</a:t>
             </a:r>
             <a:endParaRPr lang="en-US" dirty="0"/>
           </a:p>
@@ -34954,7 +35162,7 @@
           <p:cNvPr id="7" name="Text 0"/>
           <p:cNvSpPr/>
           <p:nvPr>
-            <p:ph idx="107" type="body" hasCustomPrompt="1"/>
+            <p:ph idx="2" type="body" hasCustomPrompt="1"/>
           </p:nvPr>
         </p:nvSpPr>
         <p:spPr/>
@@ -34964,7 +35172,28 @@
           <a:p>
             <a:r>
               <a:rPr lang="en-US" dirty="0"/>
-              <a:t>Source: S&amp;P Global | Web sources: https://www.spglobal.com/en/research-insights/special-reports/look-forward/data-center-frontiers/data-center-investment-moves-macro-needle</a:t>
+              <a:t>Key Actions: Implement upskilling programs focused on AI collaboration skills. Establish cross-functional teams to identify transformation opportunities. Create transition support systems for displaced workers. Develop new performance metrics for human-AI collaboration. Build partnerships with educational institutions for ongoing skill development.</a:t>
+            </a:r>
+            <a:endParaRPr lang="en-US" dirty="0"/>
+          </a:p>
+        </p:txBody>
+      </p:sp>
+      <p:sp>
+        <p:nvSpPr>
+          <p:cNvPr id="8" name="Text 0"/>
+          <p:cNvSpPr/>
+          <p:nvPr>
+            <p:ph idx="15" type="body" hasCustomPrompt="1"/>
+          </p:nvPr>
+        </p:nvSpPr>
+        <p:spPr/>
+        <p:txBody>
+          <a:bodyPr/>
+          <a:lstStyle/>
+          <a:p>
+            <a:r>
+              <a:rPr lang="en-US" dirty="0"/>
+              <a:t>Source: S&amp;P Global | Web sources: https://www.spglobal.com/en/research-insights/special-reports/generative-ai-workforce-more-redistribution-than-reduction</a:t>
             </a:r>
             <a:endParaRPr lang="en-US" dirty="0"/>
           </a:p>
@@ -36064,10 +36293,10 @@
       </p:sp>
       <p:sp>
         <p:nvSpPr>
-          <p:cNvPr id="5" name="Text 1"/>
+          <p:cNvPr id="5" name="Text 0"/>
           <p:cNvSpPr/>
           <p:nvPr>
-            <p:ph idx="103" type="body" hasCustomPrompt="1"/>
+            <p:ph idx="20" type="ftr" hasCustomPrompt="1"/>
           </p:nvPr>
         </p:nvSpPr>
         <p:spPr/>
@@ -37126,10 +37355,10 @@
       </p:sp>
       <p:sp>
         <p:nvSpPr>
-          <p:cNvPr id="8" name="Text 1"/>
+          <p:cNvPr id="8" name="Text 0"/>
           <p:cNvSpPr/>
           <p:nvPr>
-            <p:ph idx="103" type="body" hasCustomPrompt="1"/>
+            <p:ph idx="20" type="ftr" hasCustomPrompt="1"/>
           </p:nvPr>
         </p:nvSpPr>
         <p:spPr/>

</xml_diff>

<commit_message>
Fix placeholder duplication by matching idx instead of name
The addPlaceholdersToSlideLayouts function was adding duplicate placeholders
because it compared placeholder names (e.g., 'leftSubtitle' vs 'subtitleLeft')
instead of the resolved placeholder indices.

Now the function:
1. First tries to match by _placeholderIdx (the resolved index)
2. Falls back to matching by _placeholderType for placeholders without idx (like title)
3. Finally falls back to matching by placeholder name (original behavior)

This ensures that when a user adds content with { placeholder: 'leftSubtitle' }
it correctly matches the layout's 'subtitleLeft' placeholder (idx: 16)
and doesn't create a duplicate empty placeholder.
</commit_message>
<xml_diff>
--- a/testflow.pptx
+++ b/testflow.pptx
@@ -2246,12 +2246,7 @@
           <a:prstGeom prst="rect">
             <a:avLst/>
           </a:prstGeom>
-          <a:blipFill>
-            <a:blip r:embed="rId2"/>
-            <a:stretch>
-              <a:fillRect/>
-            </a:stretch>
-          </a:blipFill>
+          <a:noFill/>
         </p:spPr>
         <p:txBody>
           <a:bodyPr anchor="ctr"/>
@@ -2750,12 +2745,7 @@
           <a:prstGeom prst="rect">
             <a:avLst/>
           </a:prstGeom>
-          <a:blipFill>
-            <a:blip r:embed="rId2"/>
-            <a:stretch>
-              <a:fillRect/>
-            </a:stretch>
-          </a:blipFill>
+          <a:noFill/>
         </p:spPr>
         <p:txBody>
           <a:bodyPr anchor="ctr"/>
@@ -3465,12 +3455,7 @@
           <a:prstGeom prst="rect">
             <a:avLst/>
           </a:prstGeom>
-          <a:blipFill>
-            <a:blip r:embed="rId2"/>
-            <a:stretch>
-              <a:fillRect/>
-            </a:stretch>
-          </a:blipFill>
+          <a:noFill/>
         </p:spPr>
         <p:txBody>
           <a:bodyPr anchor="ctr"/>
@@ -15391,12 +15376,7 @@
           <a:prstGeom prst="rect">
             <a:avLst/>
           </a:prstGeom>
-          <a:blipFill>
-            <a:blip r:embed="rId2"/>
-            <a:stretch>
-              <a:fillRect/>
-            </a:stretch>
-          </a:blipFill>
+          <a:noFill/>
         </p:spPr>
         <p:txBody>
           <a:bodyPr anchor="ctr"/>
@@ -16508,12 +16488,7 @@
           <a:prstGeom prst="rect">
             <a:avLst/>
           </a:prstGeom>
-          <a:blipFill>
-            <a:blip r:embed="rId3"/>
-            <a:stretch>
-              <a:fillRect/>
-            </a:stretch>
-          </a:blipFill>
+          <a:noFill/>
         </p:spPr>
         <p:txBody>
           <a:bodyPr anchor="ctr"/>
@@ -16840,12 +16815,7 @@
           <a:prstGeom prst="rect">
             <a:avLst/>
           </a:prstGeom>
-          <a:blipFill>
-            <a:blip r:embed="rId3"/>
-            <a:stretch>
-              <a:fillRect/>
-            </a:stretch>
-          </a:blipFill>
+          <a:noFill/>
         </p:spPr>
         <p:txBody>
           <a:bodyPr anchor="ctr"/>
@@ -25245,12 +25215,7 @@
           <a:prstGeom prst="rect">
             <a:avLst/>
           </a:prstGeom>
-          <a:blipFill>
-            <a:blip r:embed="rId2"/>
-            <a:stretch>
-              <a:fillRect/>
-            </a:stretch>
-          </a:blipFill>
+          <a:noFill/>
         </p:spPr>
         <p:txBody>
           <a:bodyPr anchor="ctr"/>
@@ -34543,7 +34508,7 @@
           <p:cNvPr id="6" name="Text 0"/>
           <p:cNvSpPr/>
           <p:nvPr>
-            <p:ph idx="13" type="body" hasCustomPrompt="1"/>
+            <p:ph idx="16" type="body" hasCustomPrompt="1"/>
           </p:nvPr>
         </p:nvSpPr>
         <p:spPr/>
@@ -34585,7 +34550,7 @@
           <p:cNvPr id="8" name="Text 0"/>
           <p:cNvSpPr/>
           <p:nvPr>
-            <p:ph idx="13" type="body" hasCustomPrompt="1"/>
+            <p:ph idx="19" type="body" hasCustomPrompt="1"/>
           </p:nvPr>
         </p:nvSpPr>
         <p:spPr/>
@@ -34606,7 +34571,7 @@
           <p:cNvPr id="9" name="Text 0"/>
           <p:cNvSpPr/>
           <p:nvPr>
-            <p:ph idx="13" type="body" hasCustomPrompt="1"/>
+            <p:ph idx="20" type="body" hasCustomPrompt="1"/>
           </p:nvPr>
         </p:nvSpPr>
         <p:spPr/>

</xml_diff>